<commit_message>
Creation of powerpoint description
</commit_message>
<xml_diff>
--- a/Docs/Synoptique.pptx
+++ b/Docs/Synoptique.pptx
@@ -5,7 +5,8 @@
     <p:sldMasterId id="2147483648" r:id="rId1"/>
   </p:sldMasterIdLst>
   <p:sldIdLst>
-    <p:sldId id="256" r:id="rId2"/>
+    <p:sldId id="257" r:id="rId2"/>
+    <p:sldId id="256" r:id="rId3"/>
   </p:sldIdLst>
   <p:sldSz cx="12192000" cy="6858000"/>
   <p:notesSz cx="6858000" cy="9144000"/>
@@ -104,6 +105,11 @@
       </a:defRPr>
     </a:lvl9pPr>
   </p:defaultTextStyle>
+  <p:extLst>
+    <p:ext uri="{EFAFB233-063F-42B5-8137-9DF3F51BA10A}">
+      <p15:sldGuideLst xmlns:p15="http://schemas.microsoft.com/office/powerpoint/2012/main"/>
+    </p:ext>
+  </p:extLst>
 </p:presentation>
 </file>
 
@@ -254,7 +260,7 @@
           <a:p>
             <a:fld id="{C1D5392E-ACC0-4589-95FC-2400F7860373}" type="datetimeFigureOut">
               <a:rPr lang="fr-FR" smtClean="0"/>
-              <a:t>07/10/2020</a:t>
+              <a:t>23/11/2020</a:t>
             </a:fld>
             <a:endParaRPr lang="fr-FR"/>
           </a:p>
@@ -452,7 +458,7 @@
           <a:p>
             <a:fld id="{C1D5392E-ACC0-4589-95FC-2400F7860373}" type="datetimeFigureOut">
               <a:rPr lang="fr-FR" smtClean="0"/>
-              <a:t>07/10/2020</a:t>
+              <a:t>23/11/2020</a:t>
             </a:fld>
             <a:endParaRPr lang="fr-FR"/>
           </a:p>
@@ -660,7 +666,7 @@
           <a:p>
             <a:fld id="{C1D5392E-ACC0-4589-95FC-2400F7860373}" type="datetimeFigureOut">
               <a:rPr lang="fr-FR" smtClean="0"/>
-              <a:t>07/10/2020</a:t>
+              <a:t>23/11/2020</a:t>
             </a:fld>
             <a:endParaRPr lang="fr-FR"/>
           </a:p>
@@ -858,7 +864,7 @@
           <a:p>
             <a:fld id="{C1D5392E-ACC0-4589-95FC-2400F7860373}" type="datetimeFigureOut">
               <a:rPr lang="fr-FR" smtClean="0"/>
-              <a:t>07/10/2020</a:t>
+              <a:t>23/11/2020</a:t>
             </a:fld>
             <a:endParaRPr lang="fr-FR"/>
           </a:p>
@@ -1133,7 +1139,7 @@
           <a:p>
             <a:fld id="{C1D5392E-ACC0-4589-95FC-2400F7860373}" type="datetimeFigureOut">
               <a:rPr lang="fr-FR" smtClean="0"/>
-              <a:t>07/10/2020</a:t>
+              <a:t>23/11/2020</a:t>
             </a:fld>
             <a:endParaRPr lang="fr-FR"/>
           </a:p>
@@ -1398,7 +1404,7 @@
           <a:p>
             <a:fld id="{C1D5392E-ACC0-4589-95FC-2400F7860373}" type="datetimeFigureOut">
               <a:rPr lang="fr-FR" smtClean="0"/>
-              <a:t>07/10/2020</a:t>
+              <a:t>23/11/2020</a:t>
             </a:fld>
             <a:endParaRPr lang="fr-FR"/>
           </a:p>
@@ -1810,7 +1816,7 @@
           <a:p>
             <a:fld id="{C1D5392E-ACC0-4589-95FC-2400F7860373}" type="datetimeFigureOut">
               <a:rPr lang="fr-FR" smtClean="0"/>
-              <a:t>07/10/2020</a:t>
+              <a:t>23/11/2020</a:t>
             </a:fld>
             <a:endParaRPr lang="fr-FR"/>
           </a:p>
@@ -1951,7 +1957,7 @@
           <a:p>
             <a:fld id="{C1D5392E-ACC0-4589-95FC-2400F7860373}" type="datetimeFigureOut">
               <a:rPr lang="fr-FR" smtClean="0"/>
-              <a:t>07/10/2020</a:t>
+              <a:t>23/11/2020</a:t>
             </a:fld>
             <a:endParaRPr lang="fr-FR"/>
           </a:p>
@@ -2064,7 +2070,7 @@
           <a:p>
             <a:fld id="{C1D5392E-ACC0-4589-95FC-2400F7860373}" type="datetimeFigureOut">
               <a:rPr lang="fr-FR" smtClean="0"/>
-              <a:t>07/10/2020</a:t>
+              <a:t>23/11/2020</a:t>
             </a:fld>
             <a:endParaRPr lang="fr-FR"/>
           </a:p>
@@ -2375,7 +2381,7 @@
           <a:p>
             <a:fld id="{C1D5392E-ACC0-4589-95FC-2400F7860373}" type="datetimeFigureOut">
               <a:rPr lang="fr-FR" smtClean="0"/>
-              <a:t>07/10/2020</a:t>
+              <a:t>23/11/2020</a:t>
             </a:fld>
             <a:endParaRPr lang="fr-FR"/>
           </a:p>
@@ -2663,7 +2669,7 @@
           <a:p>
             <a:fld id="{C1D5392E-ACC0-4589-95FC-2400F7860373}" type="datetimeFigureOut">
               <a:rPr lang="fr-FR" smtClean="0"/>
-              <a:t>07/10/2020</a:t>
+              <a:t>23/11/2020</a:t>
             </a:fld>
             <a:endParaRPr lang="fr-FR"/>
           </a:p>
@@ -2904,7 +2910,7 @@
           <a:p>
             <a:fld id="{C1D5392E-ACC0-4589-95FC-2400F7860373}" type="datetimeFigureOut">
               <a:rPr lang="fr-FR" smtClean="0"/>
-              <a:t>07/10/2020</a:t>
+              <a:t>23/11/2020</a:t>
             </a:fld>
             <a:endParaRPr lang="fr-FR"/>
           </a:p>
@@ -3323,6 +3329,654 @@
       </p:grpSpPr>
       <p:sp>
         <p:nvSpPr>
+          <p:cNvPr id="4" name="ZoneTexte 3">
+            <a:extLst>
+              <a:ext uri="{FF2B5EF4-FFF2-40B4-BE49-F238E27FC236}">
+                <a16:creationId xmlns:a16="http://schemas.microsoft.com/office/drawing/2014/main" id="{0C15D37F-39D6-48B4-A59A-4398DC8D6D50}"/>
+              </a:ext>
+            </a:extLst>
+          </p:cNvPr>
+          <p:cNvSpPr txBox="1"/>
+          <p:nvPr/>
+        </p:nvSpPr>
+        <p:spPr>
+          <a:xfrm>
+            <a:off x="3951757" y="4604721"/>
+            <a:ext cx="2182961" cy="1754326"/>
+          </a:xfrm>
+          <a:prstGeom prst="rect">
+            <a:avLst/>
+          </a:prstGeom>
+          <a:solidFill>
+            <a:schemeClr val="tx2">
+              <a:lumMod val="60000"/>
+              <a:lumOff val="40000"/>
+            </a:schemeClr>
+          </a:solidFill>
+          <a:ln>
+            <a:noFill/>
+          </a:ln>
+          <a:effectLst>
+            <a:outerShdw blurRad="225425" dist="50800" dir="5220000" algn="ctr">
+              <a:srgbClr val="000000">
+                <a:alpha val="33000"/>
+              </a:srgbClr>
+            </a:outerShdw>
+          </a:effectLst>
+          <a:scene3d>
+            <a:camera prst="perspectiveFront" fov="3300000">
+              <a:rot lat="486000" lon="19530000" rev="174000"/>
+            </a:camera>
+            <a:lightRig rig="harsh" dir="t">
+              <a:rot lat="0" lon="0" rev="3000000"/>
+            </a:lightRig>
+          </a:scene3d>
+          <a:sp3d extrusionH="254000" contourW="19050">
+            <a:bevelT w="82550" h="44450" prst="angle"/>
+            <a:bevelB w="82550" h="44450" prst="angle"/>
+            <a:contourClr>
+              <a:srgbClr val="FFFFFF"/>
+            </a:contourClr>
+          </a:sp3d>
+        </p:spPr>
+        <p:txBody>
+          <a:bodyPr wrap="square" rtlCol="0">
+            <a:spAutoFit/>
+          </a:bodyPr>
+          <a:lstStyle/>
+          <a:p>
+            <a:pPr algn="ctr"/>
+            <a:r>
+              <a:rPr lang="fr-FR" b="1" dirty="0" err="1"/>
+              <a:t>GrovePiDevice</a:t>
+            </a:r>
+            <a:endParaRPr lang="fr-FR" b="1" dirty="0"/>
+          </a:p>
+          <a:p>
+            <a:r>
+              <a:rPr lang="fr-FR" dirty="0"/>
+              <a:t>Développer par Dexter Industrie</a:t>
+            </a:r>
+          </a:p>
+          <a:p>
+            <a:r>
+              <a:rPr lang="fr-FR" dirty="0"/>
+              <a:t>C# .NET 3.0</a:t>
+            </a:r>
+          </a:p>
+          <a:p>
+            <a:r>
+              <a:rPr lang="fr-FR" i="1" dirty="0"/>
+              <a:t>Communication avec la carte </a:t>
+            </a:r>
+            <a:r>
+              <a:rPr lang="fr-FR" i="1" dirty="0" err="1"/>
+              <a:t>GrovePi</a:t>
+            </a:r>
+            <a:endParaRPr lang="fr-FR" i="1" dirty="0"/>
+          </a:p>
+        </p:txBody>
+      </p:sp>
+      <p:sp>
+        <p:nvSpPr>
+          <p:cNvPr id="6" name="ZoneTexte 5">
+            <a:extLst>
+              <a:ext uri="{FF2B5EF4-FFF2-40B4-BE49-F238E27FC236}">
+                <a16:creationId xmlns:a16="http://schemas.microsoft.com/office/drawing/2014/main" id="{74222941-1372-43C3-9218-289C3D556E09}"/>
+              </a:ext>
+            </a:extLst>
+          </p:cNvPr>
+          <p:cNvSpPr txBox="1"/>
+          <p:nvPr/>
+        </p:nvSpPr>
+        <p:spPr>
+          <a:xfrm>
+            <a:off x="861646" y="766681"/>
+            <a:ext cx="3090111" cy="2308324"/>
+          </a:xfrm>
+          <a:prstGeom prst="rect">
+            <a:avLst/>
+          </a:prstGeom>
+          <a:solidFill>
+            <a:schemeClr val="tx2">
+              <a:lumMod val="60000"/>
+              <a:lumOff val="40000"/>
+            </a:schemeClr>
+          </a:solidFill>
+          <a:ln>
+            <a:noFill/>
+          </a:ln>
+          <a:effectLst>
+            <a:outerShdw blurRad="225425" dist="50800" dir="5220000" algn="ctr">
+              <a:srgbClr val="000000">
+                <a:alpha val="33000"/>
+              </a:srgbClr>
+            </a:outerShdw>
+          </a:effectLst>
+          <a:scene3d>
+            <a:camera prst="perspectiveFront" fov="3300000">
+              <a:rot lat="486000" lon="19530000" rev="174000"/>
+            </a:camera>
+            <a:lightRig rig="harsh" dir="t">
+              <a:rot lat="0" lon="0" rev="3000000"/>
+            </a:lightRig>
+          </a:scene3d>
+          <a:sp3d extrusionH="254000" contourW="19050">
+            <a:bevelT w="82550" h="44450" prst="angle"/>
+            <a:bevelB w="82550" h="44450" prst="angle"/>
+            <a:contourClr>
+              <a:srgbClr val="FFFFFF"/>
+            </a:contourClr>
+          </a:sp3d>
+        </p:spPr>
+        <p:txBody>
+          <a:bodyPr wrap="square" rtlCol="0">
+            <a:spAutoFit/>
+          </a:bodyPr>
+          <a:lstStyle/>
+          <a:p>
+            <a:pPr algn="ctr"/>
+            <a:r>
+              <a:rPr lang="fr-FR" b="1" dirty="0" err="1"/>
+              <a:t>IotProject</a:t>
+            </a:r>
+            <a:endParaRPr lang="fr-FR" b="1" dirty="0"/>
+          </a:p>
+          <a:p>
+            <a:r>
+              <a:rPr lang="fr-FR" dirty="0"/>
+              <a:t>Dépendance:</a:t>
+            </a:r>
+          </a:p>
+          <a:p>
+            <a:pPr marL="285750" indent="-285750">
+              <a:buFont typeface="Arial" panose="020B0604020202020204" pitchFamily="34" charset="0"/>
+              <a:buChar char="•"/>
+            </a:pPr>
+            <a:r>
+              <a:rPr lang="fr-FR" dirty="0" err="1"/>
+              <a:t>Avalonia</a:t>
+            </a:r>
+            <a:endParaRPr lang="fr-FR" dirty="0"/>
+          </a:p>
+          <a:p>
+            <a:pPr marL="285750" indent="-285750">
+              <a:buFont typeface="Arial" panose="020B0604020202020204" pitchFamily="34" charset="0"/>
+              <a:buChar char="•"/>
+            </a:pPr>
+            <a:r>
+              <a:rPr lang="fr-FR" dirty="0" err="1"/>
+              <a:t>Sensors</a:t>
+            </a:r>
+            <a:endParaRPr lang="fr-FR" dirty="0"/>
+          </a:p>
+          <a:p>
+            <a:pPr marL="285750" indent="-285750">
+              <a:buFont typeface="Arial" panose="020B0604020202020204" pitchFamily="34" charset="0"/>
+              <a:buChar char="•"/>
+            </a:pPr>
+            <a:r>
+              <a:rPr lang="fr-FR" dirty="0"/>
+              <a:t>Storage</a:t>
+            </a:r>
+          </a:p>
+          <a:p>
+            <a:r>
+              <a:rPr lang="fr-FR" i="1" dirty="0"/>
+              <a:t>Configuration et enregistrement des données dans la BBD</a:t>
+            </a:r>
+          </a:p>
+        </p:txBody>
+      </p:sp>
+      <p:sp>
+        <p:nvSpPr>
+          <p:cNvPr id="8" name="ZoneTexte 7">
+            <a:extLst>
+              <a:ext uri="{FF2B5EF4-FFF2-40B4-BE49-F238E27FC236}">
+                <a16:creationId xmlns:a16="http://schemas.microsoft.com/office/drawing/2014/main" id="{ADE13ECC-17E5-49E4-B64A-E4FD51991163}"/>
+              </a:ext>
+            </a:extLst>
+          </p:cNvPr>
+          <p:cNvSpPr txBox="1"/>
+          <p:nvPr/>
+        </p:nvSpPr>
+        <p:spPr>
+          <a:xfrm>
+            <a:off x="4706045" y="766681"/>
+            <a:ext cx="2551929" cy="2308324"/>
+          </a:xfrm>
+          <a:prstGeom prst="rect">
+            <a:avLst/>
+          </a:prstGeom>
+          <a:solidFill>
+            <a:schemeClr val="tx2">
+              <a:lumMod val="60000"/>
+              <a:lumOff val="40000"/>
+            </a:schemeClr>
+          </a:solidFill>
+          <a:ln>
+            <a:noFill/>
+          </a:ln>
+          <a:effectLst>
+            <a:outerShdw blurRad="225425" dist="50800" dir="5220000" algn="ctr">
+              <a:srgbClr val="000000">
+                <a:alpha val="33000"/>
+              </a:srgbClr>
+            </a:outerShdw>
+          </a:effectLst>
+          <a:scene3d>
+            <a:camera prst="perspectiveFront" fov="3300000">
+              <a:rot lat="486000" lon="19530000" rev="174000"/>
+            </a:camera>
+            <a:lightRig rig="harsh" dir="t">
+              <a:rot lat="0" lon="0" rev="3000000"/>
+            </a:lightRig>
+          </a:scene3d>
+          <a:sp3d extrusionH="254000" contourW="19050">
+            <a:bevelT w="82550" h="44450" prst="angle"/>
+            <a:bevelB w="82550" h="44450" prst="angle"/>
+            <a:contourClr>
+              <a:srgbClr val="FFFFFF"/>
+            </a:contourClr>
+          </a:sp3d>
+        </p:spPr>
+        <p:txBody>
+          <a:bodyPr wrap="square" rtlCol="0">
+            <a:spAutoFit/>
+          </a:bodyPr>
+          <a:lstStyle/>
+          <a:p>
+            <a:pPr algn="ctr"/>
+            <a:r>
+              <a:rPr lang="fr-FR" b="1" dirty="0" err="1"/>
+              <a:t>IotWebApi</a:t>
+            </a:r>
+            <a:endParaRPr lang="fr-FR" b="1" dirty="0"/>
+          </a:p>
+          <a:p>
+            <a:r>
+              <a:rPr lang="fr-FR" dirty="0"/>
+              <a:t>Dépendance:</a:t>
+            </a:r>
+          </a:p>
+          <a:p>
+            <a:pPr marL="285750" indent="-285750">
+              <a:buFont typeface="Arial" panose="020B0604020202020204" pitchFamily="34" charset="0"/>
+              <a:buChar char="•"/>
+            </a:pPr>
+            <a:r>
+              <a:rPr lang="fr-FR" dirty="0" err="1"/>
+              <a:t>EntityFramework</a:t>
+            </a:r>
+            <a:r>
+              <a:rPr lang="fr-FR" dirty="0"/>
+              <a:t> </a:t>
+            </a:r>
+            <a:r>
+              <a:rPr lang="fr-FR" dirty="0" err="1"/>
+              <a:t>Core</a:t>
+            </a:r>
+            <a:endParaRPr lang="fr-FR" dirty="0"/>
+          </a:p>
+          <a:p>
+            <a:pPr marL="285750" indent="-285750">
+              <a:buFont typeface="Arial" panose="020B0604020202020204" pitchFamily="34" charset="0"/>
+              <a:buChar char="•"/>
+            </a:pPr>
+            <a:r>
+              <a:rPr lang="fr-FR" dirty="0" err="1"/>
+              <a:t>MySqlConnector</a:t>
+            </a:r>
+            <a:endParaRPr lang="fr-FR" dirty="0"/>
+          </a:p>
+          <a:p>
+            <a:pPr marL="285750" indent="-285750">
+              <a:buFont typeface="Arial" panose="020B0604020202020204" pitchFamily="34" charset="0"/>
+              <a:buChar char="•"/>
+            </a:pPr>
+            <a:r>
+              <a:rPr lang="fr-FR" dirty="0" err="1"/>
+              <a:t>Dapper</a:t>
+            </a:r>
+            <a:endParaRPr lang="fr-FR" dirty="0"/>
+          </a:p>
+          <a:p>
+            <a:pPr marL="285750" indent="-285750">
+              <a:buFont typeface="Arial" panose="020B0604020202020204" pitchFamily="34" charset="0"/>
+              <a:buChar char="•"/>
+            </a:pPr>
+            <a:r>
+              <a:rPr lang="fr-FR" dirty="0"/>
+              <a:t>Storage</a:t>
+            </a:r>
+          </a:p>
+          <a:p>
+            <a:r>
+              <a:rPr lang="fr-FR" i="1" dirty="0"/>
+              <a:t>Permet de lire des données dans la BBD</a:t>
+            </a:r>
+          </a:p>
+        </p:txBody>
+      </p:sp>
+      <p:sp>
+        <p:nvSpPr>
+          <p:cNvPr id="10" name="ZoneTexte 9">
+            <a:extLst>
+              <a:ext uri="{FF2B5EF4-FFF2-40B4-BE49-F238E27FC236}">
+                <a16:creationId xmlns:a16="http://schemas.microsoft.com/office/drawing/2014/main" id="{AD2F4632-6CAE-47BC-B246-92DE499890D9}"/>
+              </a:ext>
+            </a:extLst>
+          </p:cNvPr>
+          <p:cNvSpPr txBox="1"/>
+          <p:nvPr/>
+        </p:nvSpPr>
+        <p:spPr>
+          <a:xfrm>
+            <a:off x="8012262" y="766681"/>
+            <a:ext cx="2551929" cy="1754326"/>
+          </a:xfrm>
+          <a:prstGeom prst="rect">
+            <a:avLst/>
+          </a:prstGeom>
+          <a:solidFill>
+            <a:schemeClr val="tx2">
+              <a:lumMod val="60000"/>
+              <a:lumOff val="40000"/>
+            </a:schemeClr>
+          </a:solidFill>
+          <a:ln>
+            <a:noFill/>
+          </a:ln>
+          <a:effectLst>
+            <a:outerShdw blurRad="225425" dist="50800" dir="5220000" algn="ctr">
+              <a:srgbClr val="000000">
+                <a:alpha val="33000"/>
+              </a:srgbClr>
+            </a:outerShdw>
+          </a:effectLst>
+          <a:scene3d>
+            <a:camera prst="perspectiveFront" fov="3300000">
+              <a:rot lat="486000" lon="19530000" rev="174000"/>
+            </a:camera>
+            <a:lightRig rig="harsh" dir="t">
+              <a:rot lat="0" lon="0" rev="3000000"/>
+            </a:lightRig>
+          </a:scene3d>
+          <a:sp3d extrusionH="254000" contourW="19050">
+            <a:bevelT w="82550" h="44450" prst="angle"/>
+            <a:bevelB w="82550" h="44450" prst="angle"/>
+            <a:contourClr>
+              <a:srgbClr val="FFFFFF"/>
+            </a:contourClr>
+          </a:sp3d>
+        </p:spPr>
+        <p:txBody>
+          <a:bodyPr wrap="square" rtlCol="0">
+            <a:spAutoFit/>
+          </a:bodyPr>
+          <a:lstStyle/>
+          <a:p>
+            <a:pPr algn="ctr"/>
+            <a:r>
+              <a:rPr lang="fr-FR" b="1" dirty="0" err="1"/>
+              <a:t>WebSite</a:t>
+            </a:r>
+            <a:endParaRPr lang="fr-FR" b="1" dirty="0"/>
+          </a:p>
+          <a:p>
+            <a:r>
+              <a:rPr lang="fr-FR" dirty="0"/>
+              <a:t>HTML CSS JavaScript</a:t>
+            </a:r>
+          </a:p>
+          <a:p>
+            <a:r>
+              <a:rPr lang="fr-FR" dirty="0"/>
+              <a:t>Apache2</a:t>
+            </a:r>
+          </a:p>
+          <a:p>
+            <a:r>
+              <a:rPr lang="fr-FR" i="1" dirty="0"/>
+              <a:t>Affiche les données des capteur en utilisant la </a:t>
+            </a:r>
+            <a:r>
+              <a:rPr lang="fr-FR" i="1" dirty="0" err="1"/>
+              <a:t>IotWebApi</a:t>
+            </a:r>
+            <a:endParaRPr lang="fr-FR" i="1" dirty="0"/>
+          </a:p>
+        </p:txBody>
+      </p:sp>
+      <p:sp>
+        <p:nvSpPr>
+          <p:cNvPr id="12" name="ZoneTexte 11">
+            <a:extLst>
+              <a:ext uri="{FF2B5EF4-FFF2-40B4-BE49-F238E27FC236}">
+                <a16:creationId xmlns:a16="http://schemas.microsoft.com/office/drawing/2014/main" id="{025D9AC8-ECCA-46D5-8F22-28EA777BF0FF}"/>
+              </a:ext>
+            </a:extLst>
+          </p:cNvPr>
+          <p:cNvSpPr txBox="1"/>
+          <p:nvPr/>
+        </p:nvSpPr>
+        <p:spPr>
+          <a:xfrm>
+            <a:off x="801489" y="4604721"/>
+            <a:ext cx="2551929" cy="1477328"/>
+          </a:xfrm>
+          <a:prstGeom prst="rect">
+            <a:avLst/>
+          </a:prstGeom>
+          <a:solidFill>
+            <a:schemeClr val="tx2">
+              <a:lumMod val="60000"/>
+              <a:lumOff val="40000"/>
+            </a:schemeClr>
+          </a:solidFill>
+          <a:ln>
+            <a:noFill/>
+          </a:ln>
+          <a:effectLst>
+            <a:outerShdw blurRad="225425" dist="50800" dir="5220000" algn="ctr">
+              <a:srgbClr val="000000">
+                <a:alpha val="33000"/>
+              </a:srgbClr>
+            </a:outerShdw>
+          </a:effectLst>
+          <a:scene3d>
+            <a:camera prst="perspectiveFront" fov="3300000">
+              <a:rot lat="486000" lon="19530000" rev="174000"/>
+            </a:camera>
+            <a:lightRig rig="harsh" dir="t">
+              <a:rot lat="0" lon="0" rev="3000000"/>
+            </a:lightRig>
+          </a:scene3d>
+          <a:sp3d extrusionH="254000" contourW="19050">
+            <a:bevelT w="82550" h="44450" prst="angle"/>
+            <a:bevelB w="82550" h="44450" prst="angle"/>
+            <a:contourClr>
+              <a:srgbClr val="FFFFFF"/>
+            </a:contourClr>
+          </a:sp3d>
+        </p:spPr>
+        <p:txBody>
+          <a:bodyPr wrap="square" rtlCol="0">
+            <a:spAutoFit/>
+          </a:bodyPr>
+          <a:lstStyle/>
+          <a:p>
+            <a:pPr algn="ctr"/>
+            <a:r>
+              <a:rPr lang="fr-FR" b="1" dirty="0" err="1"/>
+              <a:t>Sensors</a:t>
+            </a:r>
+            <a:endParaRPr lang="fr-FR" b="1" dirty="0"/>
+          </a:p>
+          <a:p>
+            <a:r>
+              <a:rPr lang="fr-FR" dirty="0"/>
+              <a:t>Dépendance:</a:t>
+            </a:r>
+          </a:p>
+          <a:p>
+            <a:pPr marL="285750" indent="-285750">
+              <a:buFont typeface="Arial" panose="020B0604020202020204" pitchFamily="34" charset="0"/>
+              <a:buChar char="•"/>
+            </a:pPr>
+            <a:r>
+              <a:rPr lang="fr-FR" dirty="0" err="1"/>
+              <a:t>GrovePiDevice</a:t>
+            </a:r>
+            <a:endParaRPr lang="fr-FR" dirty="0"/>
+          </a:p>
+          <a:p>
+            <a:r>
+              <a:rPr lang="fr-FR" i="1" dirty="0"/>
+              <a:t>Surcouche de </a:t>
+            </a:r>
+            <a:r>
+              <a:rPr lang="fr-FR" i="1" dirty="0" err="1"/>
+              <a:t>GrovePiDevice</a:t>
+            </a:r>
+            <a:endParaRPr lang="fr-FR" i="1" dirty="0"/>
+          </a:p>
+        </p:txBody>
+      </p:sp>
+      <p:sp>
+        <p:nvSpPr>
+          <p:cNvPr id="14" name="ZoneTexte 13">
+            <a:extLst>
+              <a:ext uri="{FF2B5EF4-FFF2-40B4-BE49-F238E27FC236}">
+                <a16:creationId xmlns:a16="http://schemas.microsoft.com/office/drawing/2014/main" id="{9BCF4FFA-DD28-4BCE-99B0-72A8E200767D}"/>
+              </a:ext>
+            </a:extLst>
+          </p:cNvPr>
+          <p:cNvSpPr txBox="1"/>
+          <p:nvPr/>
+        </p:nvSpPr>
+        <p:spPr>
+          <a:xfrm>
+            <a:off x="7562617" y="3681392"/>
+            <a:ext cx="2551929" cy="1200329"/>
+          </a:xfrm>
+          <a:prstGeom prst="rect">
+            <a:avLst/>
+          </a:prstGeom>
+          <a:solidFill>
+            <a:schemeClr val="tx2">
+              <a:lumMod val="60000"/>
+              <a:lumOff val="40000"/>
+            </a:schemeClr>
+          </a:solidFill>
+          <a:ln>
+            <a:noFill/>
+          </a:ln>
+          <a:effectLst>
+            <a:outerShdw blurRad="225425" dist="50800" dir="5220000" algn="ctr">
+              <a:srgbClr val="000000">
+                <a:alpha val="33000"/>
+              </a:srgbClr>
+            </a:outerShdw>
+          </a:effectLst>
+          <a:scene3d>
+            <a:camera prst="perspectiveFront" fov="3300000">
+              <a:rot lat="486000" lon="19530000" rev="174000"/>
+            </a:camera>
+            <a:lightRig rig="harsh" dir="t">
+              <a:rot lat="0" lon="0" rev="3000000"/>
+            </a:lightRig>
+          </a:scene3d>
+          <a:sp3d extrusionH="254000" contourW="19050">
+            <a:bevelT w="82550" h="44450" prst="angle"/>
+            <a:bevelB w="82550" h="44450" prst="angle"/>
+            <a:contourClr>
+              <a:srgbClr val="FFFFFF"/>
+            </a:contourClr>
+          </a:sp3d>
+        </p:spPr>
+        <p:txBody>
+          <a:bodyPr wrap="square" rtlCol="0">
+            <a:spAutoFit/>
+          </a:bodyPr>
+          <a:lstStyle/>
+          <a:p>
+            <a:pPr algn="ctr"/>
+            <a:r>
+              <a:rPr lang="fr-FR" b="1" dirty="0"/>
+              <a:t>Storage</a:t>
+            </a:r>
+          </a:p>
+          <a:p>
+            <a:r>
+              <a:rPr lang="fr-FR" dirty="0"/>
+              <a:t>Dépendance:</a:t>
+            </a:r>
+          </a:p>
+          <a:p>
+            <a:pPr marL="285750" indent="-285750">
+              <a:buFont typeface="Arial" panose="020B0604020202020204" pitchFamily="34" charset="0"/>
+              <a:buChar char="•"/>
+            </a:pPr>
+            <a:r>
+              <a:rPr lang="fr-FR" dirty="0" err="1"/>
+              <a:t>EntityFramework</a:t>
+            </a:r>
+            <a:r>
+              <a:rPr lang="fr-FR" dirty="0"/>
+              <a:t> </a:t>
+            </a:r>
+            <a:r>
+              <a:rPr lang="fr-FR" dirty="0" err="1"/>
+              <a:t>Core</a:t>
+            </a:r>
+            <a:endParaRPr lang="fr-FR" dirty="0"/>
+          </a:p>
+          <a:p>
+            <a:pPr marL="285750" indent="-285750">
+              <a:buFont typeface="Arial" panose="020B0604020202020204" pitchFamily="34" charset="0"/>
+              <a:buChar char="•"/>
+            </a:pPr>
+            <a:r>
+              <a:rPr lang="fr-FR" dirty="0" err="1"/>
+              <a:t>Sensors</a:t>
+            </a:r>
+            <a:endParaRPr lang="fr-FR" dirty="0"/>
+          </a:p>
+        </p:txBody>
+      </p:sp>
+    </p:spTree>
+    <p:extLst>
+      <p:ext uri="{BB962C8B-B14F-4D97-AF65-F5344CB8AC3E}">
+        <p14:creationId xmlns:p14="http://schemas.microsoft.com/office/powerpoint/2010/main" val="2615288001"/>
+      </p:ext>
+    </p:extLst>
+  </p:cSld>
+  <p:clrMapOvr>
+    <a:masterClrMapping/>
+  </p:clrMapOvr>
+</p:sld>
+</file>
+
+<file path=ppt/slides/slide2.xml><?xml version="1.0" encoding="utf-8"?>
+<p:sld xmlns:a="http://schemas.openxmlformats.org/drawingml/2006/main" xmlns:r="http://schemas.openxmlformats.org/officeDocument/2006/relationships" xmlns:p="http://schemas.openxmlformats.org/presentationml/2006/main">
+  <p:cSld>
+    <p:spTree>
+      <p:nvGrpSpPr>
+        <p:cNvPr id="1" name=""/>
+        <p:cNvGrpSpPr/>
+        <p:nvPr/>
+      </p:nvGrpSpPr>
+      <p:grpSpPr>
+        <a:xfrm>
+          <a:off x="0" y="0"/>
+          <a:ext cx="0" cy="0"/>
+          <a:chOff x="0" y="0"/>
+          <a:chExt cx="0" cy="0"/>
+        </a:xfrm>
+      </p:grpSpPr>
+      <p:sp>
+        <p:nvSpPr>
           <p:cNvPr id="9" name="Rectangle 8">
             <a:extLst>
               <a:ext uri="{FF2B5EF4-FFF2-40B4-BE49-F238E27FC236}">
@@ -3335,8 +3989,8 @@
         </p:nvSpPr>
         <p:spPr>
           <a:xfrm>
-            <a:off x="1047750" y="1247775"/>
-            <a:ext cx="3962400" cy="3562350"/>
+            <a:off x="1047750" y="457200"/>
+            <a:ext cx="3962400" cy="5143500"/>
           </a:xfrm>
           <a:prstGeom prst="rect">
             <a:avLst/>
@@ -3363,7 +4017,7 @@
           <a:lstStyle/>
           <a:p>
             <a:pPr algn="ctr"/>
-            <a:endParaRPr lang="fr-FR"/>
+            <a:endParaRPr lang="fr-FR" dirty="0"/>
           </a:p>
         </p:txBody>
       </p:sp>
@@ -3439,7 +4093,7 @@
         </p:nvSpPr>
         <p:spPr>
           <a:xfrm>
-            <a:off x="2215394" y="4981575"/>
+            <a:off x="2215393" y="5798653"/>
             <a:ext cx="1627112" cy="369332"/>
           </a:xfrm>
           <a:prstGeom prst="rect">
@@ -3563,10 +4217,10 @@
         </p:nvGrpSpPr>
         <p:grpSpPr>
           <a:xfrm>
-            <a:off x="1295400" y="1579685"/>
-            <a:ext cx="3338145" cy="2306515"/>
+            <a:off x="1755397" y="1791349"/>
+            <a:ext cx="2547106" cy="1735075"/>
             <a:chOff x="4439749" y="2590800"/>
-            <a:chExt cx="3200400" cy="2390775"/>
+            <a:chExt cx="3200400" cy="2472291"/>
           </a:xfrm>
         </p:grpSpPr>
         <p:pic>
@@ -3619,8 +4273,8 @@
           </p:nvSpPr>
           <p:spPr>
             <a:xfrm>
-              <a:off x="5296835" y="4335244"/>
-              <a:ext cx="1652336" cy="646331"/>
+              <a:off x="4439749" y="4536833"/>
+              <a:ext cx="3200400" cy="526258"/>
             </a:xfrm>
             <a:prstGeom prst="rect">
               <a:avLst/>
@@ -3633,13 +4287,7 @@
             </a:bodyPr>
             <a:lstStyle/>
             <a:p>
-              <a:br>
-                <a:rPr lang="fr-FR" dirty="0"/>
-              </a:br>
-              <a:r>
-                <a:rPr lang="fr-FR" dirty="0"/>
-                <a:t>Carte </a:t>
-              </a:r>
+              <a:pPr algn="ctr"/>
               <a:r>
                 <a:rPr lang="fr-FR" dirty="0" err="1"/>
                 <a:t>GrovePi</a:t>
@@ -3649,6 +4297,452 @@
           </p:txBody>
         </p:sp>
       </p:grpSp>
+      <p:grpSp>
+        <p:nvGrpSpPr>
+          <p:cNvPr id="5" name="Groupe 4">
+            <a:extLst>
+              <a:ext uri="{FF2B5EF4-FFF2-40B4-BE49-F238E27FC236}">
+                <a16:creationId xmlns:a16="http://schemas.microsoft.com/office/drawing/2014/main" id="{EA22C476-2ECE-4C14-A072-0816BDB4A4FA}"/>
+              </a:ext>
+            </a:extLst>
+          </p:cNvPr>
+          <p:cNvGrpSpPr/>
+          <p:nvPr/>
+        </p:nvGrpSpPr>
+        <p:grpSpPr>
+          <a:xfrm>
+            <a:off x="1755397" y="3623531"/>
+            <a:ext cx="2547374" cy="1837578"/>
+            <a:chOff x="1844921" y="2805111"/>
+            <a:chExt cx="2547374" cy="1837578"/>
+          </a:xfrm>
+        </p:grpSpPr>
+        <p:pic>
+          <p:nvPicPr>
+            <p:cNvPr id="3" name="Image 2" descr="Une image contenant équipement électronique, circuit&#10;&#10;Description générée automatiquement">
+              <a:extLst>
+                <a:ext uri="{FF2B5EF4-FFF2-40B4-BE49-F238E27FC236}">
+                  <a16:creationId xmlns:a16="http://schemas.microsoft.com/office/drawing/2014/main" id="{0B85680B-1ACF-4CB3-B9E6-34A8CB6DA020}"/>
+                </a:ext>
+              </a:extLst>
+            </p:cNvPr>
+            <p:cNvPicPr>
+              <a:picLocks noChangeAspect="1"/>
+            </p:cNvPicPr>
+            <p:nvPr/>
+          </p:nvPicPr>
+          <p:blipFill rotWithShape="1">
+            <a:blip r:embed="rId3">
+              <a:extLst>
+                <a:ext uri="{28A0092B-C50C-407E-A947-70E740481C1C}">
+                  <a14:useLocalDpi xmlns:a14="http://schemas.microsoft.com/office/drawing/2010/main" val="0"/>
+                </a:ext>
+              </a:extLst>
+            </a:blip>
+            <a:srcRect t="1" b="-17821"/>
+            <a:stretch/>
+          </p:blipFill>
+          <p:spPr>
+            <a:xfrm>
+              <a:off x="1844921" y="2805111"/>
+              <a:ext cx="2547105" cy="1802058"/>
+            </a:xfrm>
+            <a:prstGeom prst="rect">
+              <a:avLst/>
+            </a:prstGeom>
+          </p:spPr>
+        </p:pic>
+        <p:sp>
+          <p:nvSpPr>
+            <p:cNvPr id="4" name="ZoneTexte 3">
+              <a:extLst>
+                <a:ext uri="{FF2B5EF4-FFF2-40B4-BE49-F238E27FC236}">
+                  <a16:creationId xmlns:a16="http://schemas.microsoft.com/office/drawing/2014/main" id="{0F208C33-8DAB-4BD1-90FB-A04BB82BC8DF}"/>
+                </a:ext>
+              </a:extLst>
+            </p:cNvPr>
+            <p:cNvSpPr txBox="1"/>
+            <p:nvPr/>
+          </p:nvSpPr>
+          <p:spPr>
+            <a:xfrm>
+              <a:off x="1845190" y="4273357"/>
+              <a:ext cx="2547105" cy="369332"/>
+            </a:xfrm>
+            <a:prstGeom prst="rect">
+              <a:avLst/>
+            </a:prstGeom>
+            <a:solidFill>
+              <a:schemeClr val="bg1"/>
+            </a:solidFill>
+          </p:spPr>
+          <p:txBody>
+            <a:bodyPr wrap="square" rtlCol="0">
+              <a:spAutoFit/>
+            </a:bodyPr>
+            <a:lstStyle/>
+            <a:p>
+              <a:pPr algn="ctr"/>
+              <a:r>
+                <a:rPr lang="fr-FR" dirty="0"/>
+                <a:t>Raspberry 3b</a:t>
+              </a:r>
+            </a:p>
+          </p:txBody>
+        </p:sp>
+      </p:grpSp>
+      <p:sp>
+        <p:nvSpPr>
+          <p:cNvPr id="6" name="ZoneTexte 5">
+            <a:extLst>
+              <a:ext uri="{FF2B5EF4-FFF2-40B4-BE49-F238E27FC236}">
+                <a16:creationId xmlns:a16="http://schemas.microsoft.com/office/drawing/2014/main" id="{0874D5D6-2772-4C3F-9AD4-DFDC06F8D0CD}"/>
+              </a:ext>
+            </a:extLst>
+          </p:cNvPr>
+          <p:cNvSpPr txBox="1"/>
+          <p:nvPr/>
+        </p:nvSpPr>
+        <p:spPr>
+          <a:xfrm>
+            <a:off x="2837703" y="679834"/>
+            <a:ext cx="1464799" cy="646331"/>
+          </a:xfrm>
+          <a:prstGeom prst="rect">
+            <a:avLst/>
+          </a:prstGeom>
+        </p:spPr>
+        <p:style>
+          <a:lnRef idx="1">
+            <a:schemeClr val="dk1"/>
+          </a:lnRef>
+          <a:fillRef idx="2">
+            <a:schemeClr val="dk1"/>
+          </a:fillRef>
+          <a:effectRef idx="1">
+            <a:schemeClr val="dk1"/>
+          </a:effectRef>
+          <a:fontRef idx="minor">
+            <a:schemeClr val="dk1"/>
+          </a:fontRef>
+        </p:style>
+        <p:txBody>
+          <a:bodyPr wrap="square" rtlCol="0">
+            <a:spAutoFit/>
+          </a:bodyPr>
+          <a:lstStyle/>
+          <a:p>
+            <a:pPr algn="ctr"/>
+            <a:r>
+              <a:rPr lang="fr-FR" dirty="0" err="1"/>
+              <a:t>IotProject</a:t>
+            </a:r>
+            <a:endParaRPr lang="fr-FR" dirty="0"/>
+          </a:p>
+          <a:p>
+            <a:pPr algn="ctr"/>
+            <a:endParaRPr lang="fr-FR" dirty="0"/>
+          </a:p>
+        </p:txBody>
+      </p:sp>
+      <p:sp>
+        <p:nvSpPr>
+          <p:cNvPr id="17" name="ZoneTexte 16">
+            <a:extLst>
+              <a:ext uri="{FF2B5EF4-FFF2-40B4-BE49-F238E27FC236}">
+                <a16:creationId xmlns:a16="http://schemas.microsoft.com/office/drawing/2014/main" id="{22F4CA70-BEA2-457A-9CE2-AF9418A4584E}"/>
+              </a:ext>
+            </a:extLst>
+          </p:cNvPr>
+          <p:cNvSpPr txBox="1"/>
+          <p:nvPr/>
+        </p:nvSpPr>
+        <p:spPr>
+          <a:xfrm>
+            <a:off x="9230422" y="1825406"/>
+            <a:ext cx="1464799" cy="646331"/>
+          </a:xfrm>
+          <a:prstGeom prst="rect">
+            <a:avLst/>
+          </a:prstGeom>
+        </p:spPr>
+        <p:style>
+          <a:lnRef idx="1">
+            <a:schemeClr val="dk1"/>
+          </a:lnRef>
+          <a:fillRef idx="2">
+            <a:schemeClr val="dk1"/>
+          </a:fillRef>
+          <a:effectRef idx="1">
+            <a:schemeClr val="dk1"/>
+          </a:effectRef>
+          <a:fontRef idx="minor">
+            <a:schemeClr val="dk1"/>
+          </a:fontRef>
+        </p:style>
+        <p:txBody>
+          <a:bodyPr wrap="square" rtlCol="0">
+            <a:spAutoFit/>
+          </a:bodyPr>
+          <a:lstStyle/>
+          <a:p>
+            <a:pPr algn="ctr"/>
+            <a:r>
+              <a:rPr lang="fr-FR" dirty="0" err="1"/>
+              <a:t>SiteWeb</a:t>
+            </a:r>
+            <a:endParaRPr lang="fr-FR" dirty="0"/>
+          </a:p>
+          <a:p>
+            <a:pPr algn="ctr"/>
+            <a:endParaRPr lang="fr-FR" dirty="0"/>
+          </a:p>
+        </p:txBody>
+      </p:sp>
+      <p:sp>
+        <p:nvSpPr>
+          <p:cNvPr id="20" name="ZoneTexte 19">
+            <a:extLst>
+              <a:ext uri="{FF2B5EF4-FFF2-40B4-BE49-F238E27FC236}">
+                <a16:creationId xmlns:a16="http://schemas.microsoft.com/office/drawing/2014/main" id="{3C3A4FB3-056B-4643-9152-8335456EFEC6}"/>
+              </a:ext>
+            </a:extLst>
+          </p:cNvPr>
+          <p:cNvSpPr txBox="1"/>
+          <p:nvPr/>
+        </p:nvSpPr>
+        <p:spPr>
+          <a:xfrm>
+            <a:off x="7440053" y="3284549"/>
+            <a:ext cx="1464799" cy="369332"/>
+          </a:xfrm>
+          <a:prstGeom prst="rect">
+            <a:avLst/>
+          </a:prstGeom>
+        </p:spPr>
+        <p:style>
+          <a:lnRef idx="1">
+            <a:schemeClr val="dk1"/>
+          </a:lnRef>
+          <a:fillRef idx="2">
+            <a:schemeClr val="dk1"/>
+          </a:fillRef>
+          <a:effectRef idx="1">
+            <a:schemeClr val="dk1"/>
+          </a:effectRef>
+          <a:fontRef idx="minor">
+            <a:schemeClr val="dk1"/>
+          </a:fontRef>
+        </p:style>
+        <p:txBody>
+          <a:bodyPr wrap="square" rtlCol="0">
+            <a:spAutoFit/>
+          </a:bodyPr>
+          <a:lstStyle/>
+          <a:p>
+            <a:pPr algn="ctr"/>
+            <a:r>
+              <a:rPr lang="fr-FR" dirty="0" err="1"/>
+              <a:t>IotWebApi</a:t>
+            </a:r>
+            <a:endParaRPr lang="fr-FR" dirty="0"/>
+          </a:p>
+        </p:txBody>
+      </p:sp>
+      <p:cxnSp>
+        <p:nvCxnSpPr>
+          <p:cNvPr id="8" name="Connecteur droit avec flèche 7">
+            <a:extLst>
+              <a:ext uri="{FF2B5EF4-FFF2-40B4-BE49-F238E27FC236}">
+                <a16:creationId xmlns:a16="http://schemas.microsoft.com/office/drawing/2014/main" id="{1031BA3C-71BF-465F-86A3-B815B062417F}"/>
+              </a:ext>
+            </a:extLst>
+          </p:cNvPr>
+          <p:cNvCxnSpPr>
+            <a:stCxn id="6" idx="3"/>
+            <a:endCxn id="15" idx="0"/>
+          </p:cNvCxnSpPr>
+          <p:nvPr/>
+        </p:nvCxnSpPr>
+        <p:spPr>
+          <a:xfrm>
+            <a:off x="4302502" y="1003000"/>
+            <a:ext cx="3293687" cy="932956"/>
+          </a:xfrm>
+          <a:prstGeom prst="straightConnector1">
+            <a:avLst/>
+          </a:prstGeom>
+          <a:ln w="57150">
+            <a:solidFill>
+              <a:schemeClr val="tx1">
+                <a:lumMod val="65000"/>
+                <a:lumOff val="35000"/>
+              </a:schemeClr>
+            </a:solidFill>
+            <a:tailEnd type="triangle"/>
+          </a:ln>
+        </p:spPr>
+        <p:style>
+          <a:lnRef idx="1">
+            <a:schemeClr val="accent1"/>
+          </a:lnRef>
+          <a:fillRef idx="0">
+            <a:schemeClr val="accent1"/>
+          </a:fillRef>
+          <a:effectRef idx="0">
+            <a:schemeClr val="accent1"/>
+          </a:effectRef>
+          <a:fontRef idx="minor">
+            <a:schemeClr val="tx1"/>
+          </a:fontRef>
+        </p:style>
+      </p:cxnSp>
+      <p:cxnSp>
+        <p:nvCxnSpPr>
+          <p:cNvPr id="21" name="Connecteur droit avec flèche 20">
+            <a:extLst>
+              <a:ext uri="{FF2B5EF4-FFF2-40B4-BE49-F238E27FC236}">
+                <a16:creationId xmlns:a16="http://schemas.microsoft.com/office/drawing/2014/main" id="{320F612E-5C13-467A-BCF1-FAB593E09575}"/>
+              </a:ext>
+            </a:extLst>
+          </p:cNvPr>
+          <p:cNvCxnSpPr>
+            <a:cxnSpLocks/>
+            <a:stCxn id="6" idx="2"/>
+          </p:cNvCxnSpPr>
+          <p:nvPr/>
+        </p:nvCxnSpPr>
+        <p:spPr>
+          <a:xfrm flipH="1">
+            <a:off x="3274731" y="1326165"/>
+            <a:ext cx="295372" cy="762191"/>
+          </a:xfrm>
+          <a:prstGeom prst="straightConnector1">
+            <a:avLst/>
+          </a:prstGeom>
+          <a:ln w="57150">
+            <a:solidFill>
+              <a:schemeClr val="tx1">
+                <a:lumMod val="65000"/>
+                <a:lumOff val="35000"/>
+              </a:schemeClr>
+            </a:solidFill>
+            <a:tailEnd type="triangle"/>
+          </a:ln>
+        </p:spPr>
+        <p:style>
+          <a:lnRef idx="1">
+            <a:schemeClr val="accent1"/>
+          </a:lnRef>
+          <a:fillRef idx="0">
+            <a:schemeClr val="accent1"/>
+          </a:fillRef>
+          <a:effectRef idx="0">
+            <a:schemeClr val="accent1"/>
+          </a:effectRef>
+          <a:fontRef idx="minor">
+            <a:schemeClr val="tx1"/>
+          </a:fontRef>
+        </p:style>
+      </p:cxnSp>
+      <p:cxnSp>
+        <p:nvCxnSpPr>
+          <p:cNvPr id="23" name="Connecteur droit avec flèche 22">
+            <a:extLst>
+              <a:ext uri="{FF2B5EF4-FFF2-40B4-BE49-F238E27FC236}">
+                <a16:creationId xmlns:a16="http://schemas.microsoft.com/office/drawing/2014/main" id="{0DCA6F56-9EE2-4E9F-933A-A99721DEFE41}"/>
+              </a:ext>
+            </a:extLst>
+          </p:cNvPr>
+          <p:cNvCxnSpPr>
+            <a:cxnSpLocks/>
+            <a:stCxn id="20" idx="0"/>
+            <a:endCxn id="15" idx="1"/>
+          </p:cNvCxnSpPr>
+          <p:nvPr/>
+        </p:nvCxnSpPr>
+        <p:spPr>
+          <a:xfrm flipH="1" flipV="1">
+            <a:off x="8167689" y="2471737"/>
+            <a:ext cx="4764" cy="812812"/>
+          </a:xfrm>
+          <a:prstGeom prst="straightConnector1">
+            <a:avLst/>
+          </a:prstGeom>
+          <a:ln w="57150">
+            <a:solidFill>
+              <a:schemeClr val="tx1">
+                <a:lumMod val="65000"/>
+                <a:lumOff val="35000"/>
+              </a:schemeClr>
+            </a:solidFill>
+            <a:tailEnd type="triangle"/>
+          </a:ln>
+        </p:spPr>
+        <p:style>
+          <a:lnRef idx="1">
+            <a:schemeClr val="accent1"/>
+          </a:lnRef>
+          <a:fillRef idx="0">
+            <a:schemeClr val="accent1"/>
+          </a:fillRef>
+          <a:effectRef idx="0">
+            <a:schemeClr val="accent1"/>
+          </a:effectRef>
+          <a:fontRef idx="minor">
+            <a:schemeClr val="tx1"/>
+          </a:fontRef>
+        </p:style>
+      </p:cxnSp>
+      <p:cxnSp>
+        <p:nvCxnSpPr>
+          <p:cNvPr id="29" name="Connecteur droit avec flèche 28">
+            <a:extLst>
+              <a:ext uri="{FF2B5EF4-FFF2-40B4-BE49-F238E27FC236}">
+                <a16:creationId xmlns:a16="http://schemas.microsoft.com/office/drawing/2014/main" id="{97EB0835-83F4-4559-B9C3-434F60FDDF39}"/>
+              </a:ext>
+            </a:extLst>
+          </p:cNvPr>
+          <p:cNvCxnSpPr>
+            <a:cxnSpLocks/>
+            <a:stCxn id="17" idx="1"/>
+            <a:endCxn id="20" idx="3"/>
+          </p:cNvCxnSpPr>
+          <p:nvPr/>
+        </p:nvCxnSpPr>
+        <p:spPr>
+          <a:xfrm flipH="1">
+            <a:off x="8904852" y="2148572"/>
+            <a:ext cx="325570" cy="1320643"/>
+          </a:xfrm>
+          <a:prstGeom prst="straightConnector1">
+            <a:avLst/>
+          </a:prstGeom>
+          <a:ln w="57150">
+            <a:solidFill>
+              <a:schemeClr val="tx1">
+                <a:lumMod val="65000"/>
+                <a:lumOff val="35000"/>
+              </a:schemeClr>
+            </a:solidFill>
+            <a:tailEnd type="triangle"/>
+          </a:ln>
+        </p:spPr>
+        <p:style>
+          <a:lnRef idx="1">
+            <a:schemeClr val="accent1"/>
+          </a:lnRef>
+          <a:fillRef idx="0">
+            <a:schemeClr val="accent1"/>
+          </a:fillRef>
+          <a:effectRef idx="0">
+            <a:schemeClr val="accent1"/>
+          </a:effectRef>
+          <a:fontRef idx="minor">
+            <a:schemeClr val="tx1"/>
+          </a:fontRef>
+        </p:style>
+      </p:cxnSp>
     </p:spTree>
     <p:extLst>
       <p:ext uri="{BB962C8B-B14F-4D97-AF65-F5344CB8AC3E}">

</xml_diff>